<commit_message>
Added project report to readme file
</commit_message>
<xml_diff>
--- a/covid19 usa vaccination.pptx
+++ b/covid19 usa vaccination.pptx
@@ -4,13 +4,16 @@
   <p:sldMasterIdLst>
     <p:sldMasterId id="2147483673" r:id="rId4"/>
   </p:sldMasterIdLst>
+  <p:notesMasterIdLst>
+    <p:notesMasterId r:id="rId11"/>
+  </p:notesMasterIdLst>
   <p:sldIdLst>
     <p:sldId id="257" r:id="rId5"/>
     <p:sldId id="262" r:id="rId6"/>
-    <p:sldId id="263" r:id="rId7"/>
-    <p:sldId id="264" r:id="rId8"/>
-    <p:sldId id="265" r:id="rId9"/>
-    <p:sldId id="266" r:id="rId10"/>
+    <p:sldId id="264" r:id="rId7"/>
+    <p:sldId id="265" r:id="rId8"/>
+    <p:sldId id="266" r:id="rId9"/>
+    <p:sldId id="267" r:id="rId10"/>
   </p:sldIdLst>
   <p:sldSz cx="12192000" cy="6858000"/>
   <p:notesSz cx="6858000" cy="9144000"/>
@@ -115,6 +118,455 @@
     </p:ext>
   </p:extLst>
 </p:presentation>
+</file>
+
+<file path=ppt/notesMasters/notesMaster1.xml><?xml version="1.0" encoding="utf-8"?>
+<p:notesMaster xmlns:a="http://schemas.openxmlformats.org/drawingml/2006/main" xmlns:r="http://schemas.openxmlformats.org/officeDocument/2006/relationships" xmlns:p="http://schemas.openxmlformats.org/presentationml/2006/main">
+  <p:cSld>
+    <p:bg>
+      <p:bgRef idx="1001">
+        <a:schemeClr val="bg1"/>
+      </p:bgRef>
+    </p:bg>
+    <p:spTree>
+      <p:nvGrpSpPr>
+        <p:cNvPr id="1" name=""/>
+        <p:cNvGrpSpPr/>
+        <p:nvPr/>
+      </p:nvGrpSpPr>
+      <p:grpSpPr>
+        <a:xfrm>
+          <a:off x="0" y="0"/>
+          <a:ext cx="0" cy="0"/>
+          <a:chOff x="0" y="0"/>
+          <a:chExt cx="0" cy="0"/>
+        </a:xfrm>
+      </p:grpSpPr>
+      <p:sp>
+        <p:nvSpPr>
+          <p:cNvPr id="2" name="Header Placeholder 1"/>
+          <p:cNvSpPr>
+            <a:spLocks noGrp="1"/>
+          </p:cNvSpPr>
+          <p:nvPr>
+            <p:ph type="hdr" sz="quarter"/>
+          </p:nvPr>
+        </p:nvSpPr>
+        <p:spPr>
+          <a:xfrm>
+            <a:off x="0" y="0"/>
+            <a:ext cx="2971800" cy="458788"/>
+          </a:xfrm>
+          <a:prstGeom prst="rect">
+            <a:avLst/>
+          </a:prstGeom>
+        </p:spPr>
+        <p:txBody>
+          <a:bodyPr vert="horz" lIns="91440" tIns="45720" rIns="91440" bIns="45720" rtlCol="0"/>
+          <a:lstStyle>
+            <a:lvl1pPr algn="l">
+              <a:defRPr sz="1200"/>
+            </a:lvl1pPr>
+          </a:lstStyle>
+          <a:p>
+            <a:endParaRPr lang="en-US"/>
+          </a:p>
+        </p:txBody>
+      </p:sp>
+      <p:sp>
+        <p:nvSpPr>
+          <p:cNvPr id="3" name="Date Placeholder 2"/>
+          <p:cNvSpPr>
+            <a:spLocks noGrp="1"/>
+          </p:cNvSpPr>
+          <p:nvPr>
+            <p:ph type="dt" idx="1"/>
+          </p:nvPr>
+        </p:nvSpPr>
+        <p:spPr>
+          <a:xfrm>
+            <a:off x="3884613" y="0"/>
+            <a:ext cx="2971800" cy="458788"/>
+          </a:xfrm>
+          <a:prstGeom prst="rect">
+            <a:avLst/>
+          </a:prstGeom>
+        </p:spPr>
+        <p:txBody>
+          <a:bodyPr vert="horz" lIns="91440" tIns="45720" rIns="91440" bIns="45720" rtlCol="0"/>
+          <a:lstStyle>
+            <a:lvl1pPr algn="r">
+              <a:defRPr sz="1200"/>
+            </a:lvl1pPr>
+          </a:lstStyle>
+          <a:p>
+            <a:fld id="{A088D004-A26D-AF4B-81CD-8E23D9D7C387}" type="datetimeFigureOut">
+              <a:rPr lang="en-US" smtClean="0"/>
+              <a:t>3/22/21</a:t>
+            </a:fld>
+            <a:endParaRPr lang="en-US"/>
+          </a:p>
+        </p:txBody>
+      </p:sp>
+      <p:sp>
+        <p:nvSpPr>
+          <p:cNvPr id="4" name="Slide Image Placeholder 3"/>
+          <p:cNvSpPr>
+            <a:spLocks noGrp="1" noRot="1" noChangeAspect="1"/>
+          </p:cNvSpPr>
+          <p:nvPr>
+            <p:ph type="sldImg" idx="2"/>
+          </p:nvPr>
+        </p:nvSpPr>
+        <p:spPr>
+          <a:xfrm>
+            <a:off x="685800" y="1143000"/>
+            <a:ext cx="5486400" cy="3086100"/>
+          </a:xfrm>
+          <a:prstGeom prst="rect">
+            <a:avLst/>
+          </a:prstGeom>
+          <a:noFill/>
+          <a:ln w="12700">
+            <a:solidFill>
+              <a:prstClr val="black"/>
+            </a:solidFill>
+          </a:ln>
+        </p:spPr>
+        <p:txBody>
+          <a:bodyPr vert="horz" lIns="91440" tIns="45720" rIns="91440" bIns="45720" rtlCol="0" anchor="ctr"/>
+          <a:lstStyle/>
+          <a:p>
+            <a:endParaRPr lang="en-US"/>
+          </a:p>
+        </p:txBody>
+      </p:sp>
+      <p:sp>
+        <p:nvSpPr>
+          <p:cNvPr id="5" name="Notes Placeholder 4"/>
+          <p:cNvSpPr>
+            <a:spLocks noGrp="1"/>
+          </p:cNvSpPr>
+          <p:nvPr>
+            <p:ph type="body" sz="quarter" idx="3"/>
+          </p:nvPr>
+        </p:nvSpPr>
+        <p:spPr>
+          <a:xfrm>
+            <a:off x="685800" y="4400550"/>
+            <a:ext cx="5486400" cy="3600450"/>
+          </a:xfrm>
+          <a:prstGeom prst="rect">
+            <a:avLst/>
+          </a:prstGeom>
+        </p:spPr>
+        <p:txBody>
+          <a:bodyPr vert="horz" lIns="91440" tIns="45720" rIns="91440" bIns="45720" rtlCol="0"/>
+          <a:lstStyle/>
+          <a:p>
+            <a:pPr lvl="0"/>
+            <a:r>
+              <a:rPr lang="en-US"/>
+              <a:t>Click to edit Master text styles</a:t>
+            </a:r>
+          </a:p>
+          <a:p>
+            <a:pPr lvl="1"/>
+            <a:r>
+              <a:rPr lang="en-US"/>
+              <a:t>Second level</a:t>
+            </a:r>
+          </a:p>
+          <a:p>
+            <a:pPr lvl="2"/>
+            <a:r>
+              <a:rPr lang="en-US"/>
+              <a:t>Third level</a:t>
+            </a:r>
+          </a:p>
+          <a:p>
+            <a:pPr lvl="3"/>
+            <a:r>
+              <a:rPr lang="en-US"/>
+              <a:t>Fourth level</a:t>
+            </a:r>
+          </a:p>
+          <a:p>
+            <a:pPr lvl="4"/>
+            <a:r>
+              <a:rPr lang="en-US"/>
+              <a:t>Fifth level</a:t>
+            </a:r>
+          </a:p>
+        </p:txBody>
+      </p:sp>
+      <p:sp>
+        <p:nvSpPr>
+          <p:cNvPr id="6" name="Footer Placeholder 5"/>
+          <p:cNvSpPr>
+            <a:spLocks noGrp="1"/>
+          </p:cNvSpPr>
+          <p:nvPr>
+            <p:ph type="ftr" sz="quarter" idx="4"/>
+          </p:nvPr>
+        </p:nvSpPr>
+        <p:spPr>
+          <a:xfrm>
+            <a:off x="0" y="8685213"/>
+            <a:ext cx="2971800" cy="458787"/>
+          </a:xfrm>
+          <a:prstGeom prst="rect">
+            <a:avLst/>
+          </a:prstGeom>
+        </p:spPr>
+        <p:txBody>
+          <a:bodyPr vert="horz" lIns="91440" tIns="45720" rIns="91440" bIns="45720" rtlCol="0" anchor="b"/>
+          <a:lstStyle>
+            <a:lvl1pPr algn="l">
+              <a:defRPr sz="1200"/>
+            </a:lvl1pPr>
+          </a:lstStyle>
+          <a:p>
+            <a:endParaRPr lang="en-US"/>
+          </a:p>
+        </p:txBody>
+      </p:sp>
+      <p:sp>
+        <p:nvSpPr>
+          <p:cNvPr id="7" name="Slide Number Placeholder 6"/>
+          <p:cNvSpPr>
+            <a:spLocks noGrp="1"/>
+          </p:cNvSpPr>
+          <p:nvPr>
+            <p:ph type="sldNum" sz="quarter" idx="5"/>
+          </p:nvPr>
+        </p:nvSpPr>
+        <p:spPr>
+          <a:xfrm>
+            <a:off x="3884613" y="8685213"/>
+            <a:ext cx="2971800" cy="458787"/>
+          </a:xfrm>
+          <a:prstGeom prst="rect">
+            <a:avLst/>
+          </a:prstGeom>
+        </p:spPr>
+        <p:txBody>
+          <a:bodyPr vert="horz" lIns="91440" tIns="45720" rIns="91440" bIns="45720" rtlCol="0" anchor="b"/>
+          <a:lstStyle>
+            <a:lvl1pPr algn="r">
+              <a:defRPr sz="1200"/>
+            </a:lvl1pPr>
+          </a:lstStyle>
+          <a:p>
+            <a:fld id="{A87AE839-D961-784B-8D61-E6C0D89DC9CA}" type="slidenum">
+              <a:rPr lang="en-US" smtClean="0"/>
+              <a:t>‹#›</a:t>
+            </a:fld>
+            <a:endParaRPr lang="en-US"/>
+          </a:p>
+        </p:txBody>
+      </p:sp>
+    </p:spTree>
+    <p:extLst>
+      <p:ext uri="{BB962C8B-B14F-4D97-AF65-F5344CB8AC3E}">
+        <p14:creationId xmlns:p14="http://schemas.microsoft.com/office/powerpoint/2010/main" val="2644332896"/>
+      </p:ext>
+    </p:extLst>
+  </p:cSld>
+  <p:clrMap bg1="lt1" tx1="dk1" bg2="lt2" tx2="dk2" accent1="accent1" accent2="accent2" accent3="accent3" accent4="accent4" accent5="accent5" accent6="accent6" hlink="hlink" folHlink="folHlink"/>
+  <p:notesStyle>
+    <a:lvl1pPr marL="0" algn="l" defTabSz="914400" rtl="0" eaLnBrk="1" latinLnBrk="0" hangingPunct="1">
+      <a:defRPr sz="1200" kern="1200">
+        <a:solidFill>
+          <a:schemeClr val="tx1"/>
+        </a:solidFill>
+        <a:latin typeface="+mn-lt"/>
+        <a:ea typeface="+mn-ea"/>
+        <a:cs typeface="+mn-cs"/>
+      </a:defRPr>
+    </a:lvl1pPr>
+    <a:lvl2pPr marL="457200" algn="l" defTabSz="914400" rtl="0" eaLnBrk="1" latinLnBrk="0" hangingPunct="1">
+      <a:defRPr sz="1200" kern="1200">
+        <a:solidFill>
+          <a:schemeClr val="tx1"/>
+        </a:solidFill>
+        <a:latin typeface="+mn-lt"/>
+        <a:ea typeface="+mn-ea"/>
+        <a:cs typeface="+mn-cs"/>
+      </a:defRPr>
+    </a:lvl2pPr>
+    <a:lvl3pPr marL="914400" algn="l" defTabSz="914400" rtl="0" eaLnBrk="1" latinLnBrk="0" hangingPunct="1">
+      <a:defRPr sz="1200" kern="1200">
+        <a:solidFill>
+          <a:schemeClr val="tx1"/>
+        </a:solidFill>
+        <a:latin typeface="+mn-lt"/>
+        <a:ea typeface="+mn-ea"/>
+        <a:cs typeface="+mn-cs"/>
+      </a:defRPr>
+    </a:lvl3pPr>
+    <a:lvl4pPr marL="1371600" algn="l" defTabSz="914400" rtl="0" eaLnBrk="1" latinLnBrk="0" hangingPunct="1">
+      <a:defRPr sz="1200" kern="1200">
+        <a:solidFill>
+          <a:schemeClr val="tx1"/>
+        </a:solidFill>
+        <a:latin typeface="+mn-lt"/>
+        <a:ea typeface="+mn-ea"/>
+        <a:cs typeface="+mn-cs"/>
+      </a:defRPr>
+    </a:lvl4pPr>
+    <a:lvl5pPr marL="1828800" algn="l" defTabSz="914400" rtl="0" eaLnBrk="1" latinLnBrk="0" hangingPunct="1">
+      <a:defRPr sz="1200" kern="1200">
+        <a:solidFill>
+          <a:schemeClr val="tx1"/>
+        </a:solidFill>
+        <a:latin typeface="+mn-lt"/>
+        <a:ea typeface="+mn-ea"/>
+        <a:cs typeface="+mn-cs"/>
+      </a:defRPr>
+    </a:lvl5pPr>
+    <a:lvl6pPr marL="2286000" algn="l" defTabSz="914400" rtl="0" eaLnBrk="1" latinLnBrk="0" hangingPunct="1">
+      <a:defRPr sz="1200" kern="1200">
+        <a:solidFill>
+          <a:schemeClr val="tx1"/>
+        </a:solidFill>
+        <a:latin typeface="+mn-lt"/>
+        <a:ea typeface="+mn-ea"/>
+        <a:cs typeface="+mn-cs"/>
+      </a:defRPr>
+    </a:lvl6pPr>
+    <a:lvl7pPr marL="2743200" algn="l" defTabSz="914400" rtl="0" eaLnBrk="1" latinLnBrk="0" hangingPunct="1">
+      <a:defRPr sz="1200" kern="1200">
+        <a:solidFill>
+          <a:schemeClr val="tx1"/>
+        </a:solidFill>
+        <a:latin typeface="+mn-lt"/>
+        <a:ea typeface="+mn-ea"/>
+        <a:cs typeface="+mn-cs"/>
+      </a:defRPr>
+    </a:lvl7pPr>
+    <a:lvl8pPr marL="3200400" algn="l" defTabSz="914400" rtl="0" eaLnBrk="1" latinLnBrk="0" hangingPunct="1">
+      <a:defRPr sz="1200" kern="1200">
+        <a:solidFill>
+          <a:schemeClr val="tx1"/>
+        </a:solidFill>
+        <a:latin typeface="+mn-lt"/>
+        <a:ea typeface="+mn-ea"/>
+        <a:cs typeface="+mn-cs"/>
+      </a:defRPr>
+    </a:lvl8pPr>
+    <a:lvl9pPr marL="3657600" algn="l" defTabSz="914400" rtl="0" eaLnBrk="1" latinLnBrk="0" hangingPunct="1">
+      <a:defRPr sz="1200" kern="1200">
+        <a:solidFill>
+          <a:schemeClr val="tx1"/>
+        </a:solidFill>
+        <a:latin typeface="+mn-lt"/>
+        <a:ea typeface="+mn-ea"/>
+        <a:cs typeface="+mn-cs"/>
+      </a:defRPr>
+    </a:lvl9pPr>
+  </p:notesStyle>
+</p:notesMaster>
+</file>
+
+<file path=ppt/notesSlides/notesSlide1.xml><?xml version="1.0" encoding="utf-8"?>
+<p:notes xmlns:a="http://schemas.openxmlformats.org/drawingml/2006/main" xmlns:r="http://schemas.openxmlformats.org/officeDocument/2006/relationships" xmlns:p="http://schemas.openxmlformats.org/presentationml/2006/main">
+  <p:cSld>
+    <p:spTree>
+      <p:nvGrpSpPr>
+        <p:cNvPr id="1" name=""/>
+        <p:cNvGrpSpPr/>
+        <p:nvPr/>
+      </p:nvGrpSpPr>
+      <p:grpSpPr>
+        <a:xfrm>
+          <a:off x="0" y="0"/>
+          <a:ext cx="0" cy="0"/>
+          <a:chOff x="0" y="0"/>
+          <a:chExt cx="0" cy="0"/>
+        </a:xfrm>
+      </p:grpSpPr>
+      <p:sp>
+        <p:nvSpPr>
+          <p:cNvPr id="2" name="Slide Image Placeholder 1"/>
+          <p:cNvSpPr>
+            <a:spLocks noGrp="1" noRot="1" noChangeAspect="1"/>
+          </p:cNvSpPr>
+          <p:nvPr>
+            <p:ph type="sldImg"/>
+          </p:nvPr>
+        </p:nvSpPr>
+        <p:spPr/>
+      </p:sp>
+      <p:sp>
+        <p:nvSpPr>
+          <p:cNvPr id="3" name="Notes Placeholder 2"/>
+          <p:cNvSpPr>
+            <a:spLocks noGrp="1"/>
+          </p:cNvSpPr>
+          <p:nvPr>
+            <p:ph type="body" idx="1"/>
+          </p:nvPr>
+        </p:nvSpPr>
+        <p:spPr/>
+        <p:txBody>
+          <a:bodyPr/>
+          <a:lstStyle/>
+          <a:p>
+            <a:r>
+              <a:rPr lang="en-US" dirty="0"/>
+              <a:t>Kaggle = COVID Vaccination Data</a:t>
+            </a:r>
+          </a:p>
+          <a:p>
+            <a:endParaRPr lang="en-US" dirty="0"/>
+          </a:p>
+          <a:p>
+            <a:r>
+              <a:rPr lang="en-US" dirty="0" err="1"/>
+              <a:t>CovidTracking.com</a:t>
+            </a:r>
+            <a:r>
+              <a:rPr lang="en-US" dirty="0"/>
+              <a:t> = COVID Cases Data</a:t>
+            </a:r>
+          </a:p>
+        </p:txBody>
+      </p:sp>
+      <p:sp>
+        <p:nvSpPr>
+          <p:cNvPr id="4" name="Slide Number Placeholder 3"/>
+          <p:cNvSpPr>
+            <a:spLocks noGrp="1"/>
+          </p:cNvSpPr>
+          <p:nvPr>
+            <p:ph type="sldNum" sz="quarter" idx="5"/>
+          </p:nvPr>
+        </p:nvSpPr>
+        <p:spPr/>
+        <p:txBody>
+          <a:bodyPr/>
+          <a:lstStyle/>
+          <a:p>
+            <a:fld id="{A87AE839-D961-784B-8D61-E6C0D89DC9CA}" type="slidenum">
+              <a:rPr lang="en-US" smtClean="0"/>
+              <a:t>2</a:t>
+            </a:fld>
+            <a:endParaRPr lang="en-US"/>
+          </a:p>
+        </p:txBody>
+      </p:sp>
+    </p:spTree>
+    <p:extLst>
+      <p:ext uri="{BB962C8B-B14F-4D97-AF65-F5344CB8AC3E}">
+        <p14:creationId xmlns:p14="http://schemas.microsoft.com/office/powerpoint/2010/main" val="2766411398"/>
+      </p:ext>
+    </p:extLst>
+  </p:cSld>
+  <p:clrMapOvr>
+    <a:masterClrMapping/>
+  </p:clrMapOvr>
+</p:notes>
 </file>
 
 <file path=ppt/slideLayouts/slideLayout1.xml><?xml version="1.0" encoding="utf-8"?>
@@ -4054,7 +4506,7 @@
         </p:blipFill>
         <p:spPr>
           <a:xfrm>
-            <a:off x="20" y="10"/>
+            <a:off x="20" y="268366"/>
             <a:ext cx="12191980" cy="6857990"/>
           </a:xfrm>
           <a:prstGeom prst="rect">
@@ -4062,95 +4514,6 @@
           </a:prstGeom>
         </p:spPr>
       </p:pic>
-      <p:sp>
-        <p:nvSpPr>
-          <p:cNvPr id="82" name="Rectangle 81">
-            <a:extLst>
-              <a:ext uri="{FF2B5EF4-FFF2-40B4-BE49-F238E27FC236}">
-                <a16:creationId xmlns:a16="http://schemas.microsoft.com/office/drawing/2014/main" id="{2644B391-9BFE-445C-A9EC-F544BB85FBC7}"/>
-              </a:ext>
-              <a:ext uri="{C183D7F6-B498-43B3-948B-1728B52AA6E4}">
-                <adec:decorative xmlns:adec="http://schemas.microsoft.com/office/drawing/2017/decorative" val="1"/>
-              </a:ext>
-            </a:extLst>
-          </p:cNvPr>
-          <p:cNvSpPr>
-            <a:spLocks noGrp="1" noRot="1" noChangeAspect="1" noMove="1" noResize="1" noEditPoints="1" noAdjustHandles="1" noChangeArrowheads="1" noChangeShapeType="1" noTextEdit="1"/>
-          </p:cNvSpPr>
-          <p:nvPr>
-            <p:extLst>
-              <p:ext uri="{386F3935-93C4-4BCD-93E2-E3B085C9AB24}">
-                <p16:designElem xmlns:p16="http://schemas.microsoft.com/office/powerpoint/2015/main" val="1"/>
-              </p:ext>
-            </p:extLst>
-          </p:nvPr>
-        </p:nvSpPr>
-        <p:spPr>
-          <a:xfrm>
-            <a:off x="5695067" y="1808532"/>
-            <a:ext cx="5452527" cy="3240936"/>
-          </a:xfrm>
-          <a:prstGeom prst="rect">
-            <a:avLst/>
-          </a:prstGeom>
-          <a:solidFill>
-            <a:schemeClr val="bg1">
-              <a:lumMod val="75000"/>
-              <a:lumOff val="25000"/>
-            </a:schemeClr>
-          </a:solidFill>
-          <a:ln w="6350" cap="sq" cmpd="sng" algn="ctr">
-            <a:noFill/>
-            <a:prstDash val="solid"/>
-            <a:miter lim="800000"/>
-          </a:ln>
-          <a:effectLst/>
-        </p:spPr>
-      </p:sp>
-      <p:sp>
-        <p:nvSpPr>
-          <p:cNvPr id="84" name="Rectangle 83">
-            <a:extLst>
-              <a:ext uri="{FF2B5EF4-FFF2-40B4-BE49-F238E27FC236}">
-                <a16:creationId xmlns:a16="http://schemas.microsoft.com/office/drawing/2014/main" id="{80F26E69-87D9-4655-AE7B-280A87AA3CAD}"/>
-              </a:ext>
-              <a:ext uri="{C183D7F6-B498-43B3-948B-1728B52AA6E4}">
-                <adec:decorative xmlns:adec="http://schemas.microsoft.com/office/drawing/2017/decorative" val="1"/>
-              </a:ext>
-            </a:extLst>
-          </p:cNvPr>
-          <p:cNvSpPr>
-            <a:spLocks noGrp="1" noRot="1" noChangeAspect="1" noMove="1" noResize="1" noEditPoints="1" noAdjustHandles="1" noChangeArrowheads="1" noChangeShapeType="1" noTextEdit="1"/>
-          </p:cNvSpPr>
-          <p:nvPr>
-            <p:extLst>
-              <p:ext uri="{386F3935-93C4-4BCD-93E2-E3B085C9AB24}">
-                <p16:designElem xmlns:p16="http://schemas.microsoft.com/office/powerpoint/2015/main" val="1"/>
-              </p:ext>
-            </p:extLst>
-          </p:nvPr>
-        </p:nvSpPr>
-        <p:spPr>
-          <a:xfrm>
-            <a:off x="5861010" y="1975104"/>
-            <a:ext cx="5120640" cy="2907792"/>
-          </a:xfrm>
-          <a:prstGeom prst="rect">
-            <a:avLst/>
-          </a:prstGeom>
-          <a:noFill/>
-          <a:ln w="6350" cap="sq" cmpd="sng" algn="ctr">
-            <a:solidFill>
-              <a:schemeClr val="tx1"/>
-            </a:solidFill>
-            <a:prstDash val="solid"/>
-            <a:miter lim="800000"/>
-          </a:ln>
-          <a:effectLst>
-            <a:softEdge rad="0"/>
-          </a:effectLst>
-        </p:spPr>
-      </p:sp>
       <p:sp>
         <p:nvSpPr>
           <p:cNvPr id="2" name="Title 1">
@@ -4275,7 +4638,7 @@
                   <a:schemeClr val="tx1"/>
                 </a:solidFill>
               </a:rPr>
-              <a:t>Akanksha, Brad and Cameron </a:t>
+              <a:t>Akanksha, Cameron and Brad</a:t>
             </a:r>
           </a:p>
         </p:txBody>
@@ -4326,7 +4689,12 @@
             <p:ph type="title"/>
           </p:nvPr>
         </p:nvSpPr>
-        <p:spPr/>
+        <p:spPr>
+          <a:xfrm>
+            <a:off x="1629156" y="2275165"/>
+            <a:ext cx="8933688" cy="1402313"/>
+          </a:xfrm>
+        </p:spPr>
         <p:txBody>
           <a:bodyPr/>
           <a:lstStyle/>
@@ -4354,15 +4722,47 @@
             <p:ph type="body" idx="1"/>
           </p:nvPr>
         </p:nvSpPr>
-        <p:spPr/>
-        <p:txBody>
-          <a:bodyPr/>
+        <p:spPr>
+          <a:xfrm>
+            <a:off x="1629156" y="3876261"/>
+            <a:ext cx="8939784" cy="1263001"/>
+          </a:xfrm>
+        </p:spPr>
+        <p:txBody>
+          <a:bodyPr>
+            <a:normAutofit/>
+          </a:bodyPr>
           <a:lstStyle/>
           <a:p>
             <a:r>
               <a:rPr lang="en-US" dirty="0"/>
-              <a:t>Kaggle.com and Covidtracking.com</a:t>
-            </a:r>
+              <a:t>CSV file from </a:t>
+            </a:r>
+            <a:r>
+              <a:rPr lang="en-US" dirty="0" err="1"/>
+              <a:t>Kaggle.com</a:t>
+            </a:r>
+            <a:r>
+              <a:rPr lang="en-US" dirty="0"/>
+              <a:t> </a:t>
+            </a:r>
+          </a:p>
+          <a:p>
+            <a:r>
+              <a:rPr lang="en-US" dirty="0"/>
+              <a:t>and </a:t>
+            </a:r>
+          </a:p>
+          <a:p>
+            <a:r>
+              <a:rPr lang="en-US" dirty="0"/>
+              <a:t> JSON data from </a:t>
+            </a:r>
+            <a:r>
+              <a:rPr lang="en-US" dirty="0" err="1"/>
+              <a:t>Covidtracking.com</a:t>
+            </a:r>
+            <a:endParaRPr lang="en-US" dirty="0"/>
           </a:p>
         </p:txBody>
       </p:sp>
@@ -4401,7 +4801,7 @@
           <p:cNvPr id="2" name="Title 1">
             <a:extLst>
               <a:ext uri="{FF2B5EF4-FFF2-40B4-BE49-F238E27FC236}">
-                <a16:creationId xmlns:a16="http://schemas.microsoft.com/office/drawing/2014/main" id="{1A304E77-C0E7-4869-9B8A-08B6CA2EB4C5}"/>
+                <a16:creationId xmlns:a16="http://schemas.microsoft.com/office/drawing/2014/main" id="{04EBCF61-D34F-4EE3-9D7F-11069E472001}"/>
               </a:ext>
             </a:extLst>
           </p:cNvPr>
@@ -4419,17 +4819,17 @@
           <a:p>
             <a:r>
               <a:rPr lang="en-US" dirty="0"/>
-              <a:t>Data type</a:t>
-            </a:r>
-          </a:p>
-        </p:txBody>
-      </p:sp>
-      <p:sp>
-        <p:nvSpPr>
-          <p:cNvPr id="3" name="Text Placeholder 2">
+              <a:t>Libraries Utilized</a:t>
+            </a:r>
+          </a:p>
+        </p:txBody>
+      </p:sp>
+      <p:sp>
+        <p:nvSpPr>
+          <p:cNvPr id="3" name="Content Placeholder 2">
             <a:extLst>
               <a:ext uri="{FF2B5EF4-FFF2-40B4-BE49-F238E27FC236}">
-                <a16:creationId xmlns:a16="http://schemas.microsoft.com/office/drawing/2014/main" id="{7091E23D-3DA3-4F43-87B8-5E9EB803C510}"/>
+                <a16:creationId xmlns:a16="http://schemas.microsoft.com/office/drawing/2014/main" id="{A2627992-747E-4903-8C5E-0728A49FEA6E}"/>
               </a:ext>
             </a:extLst>
           </p:cNvPr>
@@ -4437,7 +4837,7 @@
             <a:spLocks noGrp="1"/>
           </p:cNvSpPr>
           <p:nvPr>
-            <p:ph type="body" idx="1"/>
+            <p:ph idx="1"/>
           </p:nvPr>
         </p:nvSpPr>
         <p:spPr/>
@@ -4445,17 +4845,166 @@
           <a:bodyPr/>
           <a:lstStyle/>
           <a:p>
+            <a:endParaRPr lang="en-US" dirty="0"/>
+          </a:p>
+          <a:p>
+            <a:pPr marL="0" indent="0" algn="ctr">
+              <a:buNone/>
+            </a:pPr>
+            <a:r>
+              <a:rPr lang="en-US" sz="2400" b="1" dirty="0"/>
+              <a:t>Extract</a:t>
+            </a:r>
+          </a:p>
+          <a:p>
             <a:r>
               <a:rPr lang="en-US" dirty="0"/>
-              <a:t>CSV and JSON</a:t>
-            </a:r>
+              <a:t>Use pandas to extract data from source.</a:t>
+            </a:r>
+          </a:p>
+          <a:p>
+            <a:endParaRPr lang="en-US" dirty="0"/>
+          </a:p>
+          <a:p>
+            <a:pPr marL="0" indent="0" algn="ctr">
+              <a:buNone/>
+            </a:pPr>
+            <a:r>
+              <a:rPr lang="en-US" sz="2400" b="1" dirty="0"/>
+              <a:t>Transform</a:t>
+            </a:r>
+          </a:p>
+          <a:p>
+            <a:r>
+              <a:rPr lang="en-US" dirty="0"/>
+              <a:t>Cleaned up the CSV in various ways including:</a:t>
+            </a:r>
+          </a:p>
+          <a:p>
+            <a:pPr lvl="1"/>
+            <a:r>
+              <a:rPr lang="en-US" dirty="0"/>
+              <a:t>Dropped columns</a:t>
+            </a:r>
+          </a:p>
+          <a:p>
+            <a:pPr lvl="1"/>
+            <a:r>
+              <a:rPr lang="en-US" dirty="0"/>
+              <a:t>Reassigned data types </a:t>
+            </a:r>
+          </a:p>
+          <a:p>
+            <a:pPr lvl="2"/>
+            <a:r>
+              <a:rPr lang="en-US" dirty="0"/>
+              <a:t>“int” to “datetime”</a:t>
+            </a:r>
+          </a:p>
+          <a:p>
+            <a:pPr lvl="2"/>
+            <a:r>
+              <a:rPr lang="en-US" dirty="0"/>
+              <a:t>“object” to “int”</a:t>
+            </a:r>
+          </a:p>
+          <a:p>
+            <a:pPr lvl="1"/>
+            <a:r>
+              <a:rPr lang="en-US" dirty="0"/>
+              <a:t>Dropped Nan values</a:t>
+            </a:r>
+          </a:p>
+          <a:p>
+            <a:pPr lvl="2"/>
+            <a:r>
+              <a:rPr lang="en-US" dirty="0"/>
+              <a:t>By doing this, several dates were dropped. This necessitated additional date filtering to line up the JSON data with the CSV file.</a:t>
+            </a:r>
+          </a:p>
+          <a:p>
+            <a:pPr lvl="1"/>
+            <a:r>
+              <a:rPr lang="en-US" dirty="0"/>
+              <a:t>Filtered by target country (USA)</a:t>
+            </a:r>
+          </a:p>
+          <a:p>
+            <a:pPr marL="274320" lvl="1" indent="0">
+              <a:buNone/>
+            </a:pPr>
+            <a:endParaRPr lang="en-US" dirty="0"/>
+          </a:p>
+          <a:p>
+            <a:pPr lvl="1"/>
+            <a:endParaRPr lang="en-US" dirty="0"/>
+          </a:p>
+        </p:txBody>
+      </p:sp>
+      <p:sp>
+        <p:nvSpPr>
+          <p:cNvPr id="4" name="Text Placeholder 3">
+            <a:extLst>
+              <a:ext uri="{FF2B5EF4-FFF2-40B4-BE49-F238E27FC236}">
+                <a16:creationId xmlns:a16="http://schemas.microsoft.com/office/drawing/2014/main" id="{B398A636-4188-4788-B39B-D8248F28C5A0}"/>
+              </a:ext>
+            </a:extLst>
+          </p:cNvPr>
+          <p:cNvSpPr>
+            <a:spLocks noGrp="1"/>
+          </p:cNvSpPr>
+          <p:nvPr>
+            <p:ph type="body" sz="half" idx="2"/>
+          </p:nvPr>
+        </p:nvSpPr>
+        <p:spPr/>
+        <p:txBody>
+          <a:bodyPr/>
+          <a:lstStyle/>
+          <a:p>
+            <a:endParaRPr lang="en-US" dirty="0"/>
+          </a:p>
+          <a:p>
+            <a:r>
+              <a:rPr lang="en-US" dirty="0"/>
+              <a:t>Pandas</a:t>
+            </a:r>
+          </a:p>
+          <a:p>
+            <a:r>
+              <a:rPr lang="en-US" dirty="0"/>
+              <a:t>Datetime</a:t>
+            </a:r>
+          </a:p>
+          <a:p>
+            <a:r>
+              <a:rPr lang="en-US" dirty="0" err="1"/>
+              <a:t>Numpy</a:t>
+            </a:r>
+            <a:endParaRPr lang="en-US" dirty="0"/>
+          </a:p>
+          <a:p>
+            <a:r>
+              <a:rPr lang="en-US" dirty="0"/>
+              <a:t>Psycopg2</a:t>
+            </a:r>
+          </a:p>
+          <a:p>
+            <a:r>
+              <a:rPr lang="en-US" dirty="0" err="1"/>
+              <a:t>SQLAlchemy</a:t>
+            </a:r>
+            <a:endParaRPr lang="en-US" dirty="0"/>
+          </a:p>
+          <a:p>
+            <a:endParaRPr lang="en-US" dirty="0"/>
           </a:p>
         </p:txBody>
       </p:sp>
     </p:spTree>
     <p:extLst>
       <p:ext uri="{BB962C8B-B14F-4D97-AF65-F5344CB8AC3E}">
-        <p14:creationId xmlns:p14="http://schemas.microsoft.com/office/powerpoint/2010/main" val="638945493"/>
+        <p14:creationId xmlns:p14="http://schemas.microsoft.com/office/powerpoint/2010/main" val="298712265"/>
       </p:ext>
     </p:extLst>
   </p:cSld>
@@ -4484,34 +5033,6 @@
       </p:grpSpPr>
       <p:sp>
         <p:nvSpPr>
-          <p:cNvPr id="2" name="Title 1">
-            <a:extLst>
-              <a:ext uri="{FF2B5EF4-FFF2-40B4-BE49-F238E27FC236}">
-                <a16:creationId xmlns:a16="http://schemas.microsoft.com/office/drawing/2014/main" id="{04EBCF61-D34F-4EE3-9D7F-11069E472001}"/>
-              </a:ext>
-            </a:extLst>
-          </p:cNvPr>
-          <p:cNvSpPr>
-            <a:spLocks noGrp="1"/>
-          </p:cNvSpPr>
-          <p:nvPr>
-            <p:ph type="title"/>
-          </p:nvPr>
-        </p:nvSpPr>
-        <p:spPr/>
-        <p:txBody>
-          <a:bodyPr/>
-          <a:lstStyle/>
-          <a:p>
-            <a:r>
-              <a:rPr lang="en-US" dirty="0"/>
-              <a:t>Libraries Utilized</a:t>
-            </a:r>
-          </a:p>
-        </p:txBody>
-      </p:sp>
-      <p:sp>
-        <p:nvSpPr>
           <p:cNvPr id="3" name="Content Placeholder 2">
             <a:extLst>
               <a:ext uri="{FF2B5EF4-FFF2-40B4-BE49-F238E27FC236}">
@@ -4531,24 +5052,9 @@
           <a:bodyPr/>
           <a:lstStyle/>
           <a:p>
-            <a:endParaRPr lang="en-US" dirty="0"/>
-          </a:p>
-          <a:p>
-            <a:pPr marL="0" indent="0" algn="ctr">
+            <a:pPr marL="274320" lvl="1" indent="0">
               <a:buNone/>
             </a:pPr>
-            <a:r>
-              <a:rPr lang="en-US" sz="2400" b="1" dirty="0"/>
-              <a:t>Extract</a:t>
-            </a:r>
-          </a:p>
-          <a:p>
-            <a:r>
-              <a:rPr lang="en-US" dirty="0"/>
-              <a:t>Use pandas to extract data from source.</a:t>
-            </a:r>
-          </a:p>
-          <a:p>
             <a:endParaRPr lang="en-US" dirty="0"/>
           </a:p>
           <a:p>
@@ -4563,14 +5069,28 @@
           <a:p>
             <a:r>
               <a:rPr lang="en-US" dirty="0"/>
-              <a:t>Cleaned up the CSV in various ways including:</a:t>
+              <a:t>Cleaned up the JSON in various ways including:</a:t>
             </a:r>
           </a:p>
           <a:p>
             <a:pPr lvl="1"/>
             <a:r>
               <a:rPr lang="en-US" dirty="0"/>
-              <a:t>Dropped columns</a:t>
+              <a:t>No API key was required as the data is public.</a:t>
+            </a:r>
+          </a:p>
+          <a:p>
+            <a:pPr lvl="1"/>
+            <a:r>
+              <a:rPr lang="en-US" dirty="0"/>
+              <a:t>Filtered by “date”, “positive” and “negative” cases.</a:t>
+            </a:r>
+          </a:p>
+          <a:p>
+            <a:pPr lvl="1"/>
+            <a:r>
+              <a:rPr lang="en-US" dirty="0"/>
+              <a:t>Dropped Nan values.</a:t>
             </a:r>
           </a:p>
           <a:p>
@@ -4584,36 +5104,40 @@
             <a:pPr lvl="2"/>
             <a:r>
               <a:rPr lang="en-US" dirty="0"/>
-              <a:t>“int” to “datetime”</a:t>
+              <a:t>“float” to “int”</a:t>
             </a:r>
           </a:p>
           <a:p>
             <a:pPr lvl="2"/>
             <a:r>
               <a:rPr lang="en-US" dirty="0"/>
-              <a:t>“object” to “int”</a:t>
+              <a:t>“int” to “Datetime”</a:t>
+            </a:r>
+          </a:p>
+          <a:p>
+            <a:pPr lvl="3"/>
+            <a:r>
+              <a:rPr lang="en-US" dirty="0"/>
+              <a:t>In converting to “Datetime” we found it necessary to first convert ”int” to ”string” and then ”string” to ”Datetime”.</a:t>
             </a:r>
           </a:p>
           <a:p>
             <a:pPr lvl="1"/>
             <a:r>
               <a:rPr lang="en-US" dirty="0"/>
-              <a:t>Dropped Nan values</a:t>
-            </a:r>
-          </a:p>
-          <a:p>
-            <a:pPr lvl="2"/>
+              <a:t>Sorted values in ascending order to match CSV data.</a:t>
+            </a:r>
+          </a:p>
+          <a:p>
+            <a:pPr lvl="1"/>
             <a:r>
               <a:rPr lang="en-US" dirty="0"/>
-              <a:t>By doing this, several dates were dropped. This necessitated additional date filtering to line up the JSON data with the CSV file.</a:t>
+              <a:t>Filtered date range to match CSV data due to the fact that the Vaccine data necessarily had a narrower range of dates than COVID cases data.</a:t>
             </a:r>
           </a:p>
           <a:p>
             <a:pPr lvl="1"/>
-            <a:r>
-              <a:rPr lang="en-US" dirty="0"/>
-              <a:t>Filtered by target country (USA)</a:t>
-            </a:r>
+            <a:endParaRPr lang="en-US" dirty="0"/>
           </a:p>
           <a:p>
             <a:pPr marL="274320" lvl="1" indent="0">
@@ -4627,70 +5151,40 @@
           </a:p>
         </p:txBody>
       </p:sp>
-      <p:sp>
-        <p:nvSpPr>
-          <p:cNvPr id="4" name="Text Placeholder 3">
+      <p:pic>
+        <p:nvPicPr>
+          <p:cNvPr id="10" name="Picture 9" descr="A picture containing cake, fruit, decorated, plant&#10;&#10;Description automatically generated">
             <a:extLst>
               <a:ext uri="{FF2B5EF4-FFF2-40B4-BE49-F238E27FC236}">
-                <a16:creationId xmlns:a16="http://schemas.microsoft.com/office/drawing/2014/main" id="{B398A636-4188-4788-B39B-D8248F28C5A0}"/>
+                <a16:creationId xmlns:a16="http://schemas.microsoft.com/office/drawing/2014/main" id="{85DFA71E-E5FE-3F4E-BD9E-4BFA550A89E2}"/>
               </a:ext>
             </a:extLst>
           </p:cNvPr>
-          <p:cNvSpPr>
-            <a:spLocks noGrp="1"/>
-          </p:cNvSpPr>
-          <p:nvPr>
-            <p:ph type="body" sz="half" idx="2"/>
-          </p:nvPr>
-        </p:nvSpPr>
-        <p:spPr/>
-        <p:txBody>
-          <a:bodyPr/>
-          <a:lstStyle/>
-          <a:p>
-            <a:endParaRPr lang="en-US" dirty="0"/>
-          </a:p>
-          <a:p>
-            <a:r>
-              <a:rPr lang="en-US" dirty="0"/>
-              <a:t>Pandas</a:t>
-            </a:r>
-          </a:p>
-          <a:p>
-            <a:r>
-              <a:rPr lang="en-US" dirty="0"/>
-              <a:t>Datetime</a:t>
-            </a:r>
-          </a:p>
-          <a:p>
-            <a:r>
-              <a:rPr lang="en-US" dirty="0" err="1"/>
-              <a:t>Numpy</a:t>
-            </a:r>
-            <a:endParaRPr lang="en-US" dirty="0"/>
-          </a:p>
-          <a:p>
-            <a:r>
-              <a:rPr lang="en-US" dirty="0"/>
-              <a:t>Psycopg2</a:t>
-            </a:r>
-          </a:p>
-          <a:p>
-            <a:r>
-              <a:rPr lang="en-US" dirty="0" err="1"/>
-              <a:t>SQLAlchemy</a:t>
-            </a:r>
-            <a:endParaRPr lang="en-US" dirty="0"/>
-          </a:p>
-          <a:p>
-            <a:endParaRPr lang="en-US" dirty="0"/>
-          </a:p>
-        </p:txBody>
-      </p:sp>
+          <p:cNvPicPr>
+            <a:picLocks noChangeAspect="1"/>
+          </p:cNvPicPr>
+          <p:nvPr/>
+        </p:nvPicPr>
+        <p:blipFill>
+          <a:blip r:embed="rId2"/>
+          <a:stretch>
+            <a:fillRect/>
+          </a:stretch>
+        </p:blipFill>
+        <p:spPr>
+          <a:xfrm>
+            <a:off x="8304696" y="1529522"/>
+            <a:ext cx="3494156" cy="3494156"/>
+          </a:xfrm>
+          <a:prstGeom prst="rect">
+            <a:avLst/>
+          </a:prstGeom>
+        </p:spPr>
+      </p:pic>
     </p:spTree>
     <p:extLst>
       <p:ext uri="{BB962C8B-B14F-4D97-AF65-F5344CB8AC3E}">
-        <p14:creationId xmlns:p14="http://schemas.microsoft.com/office/powerpoint/2010/main" val="298712265"/>
+        <p14:creationId xmlns:p14="http://schemas.microsoft.com/office/powerpoint/2010/main" val="2973721604"/>
       </p:ext>
     </p:extLst>
   </p:cSld>
@@ -4749,186 +5243,6 @@
             </a:pPr>
             <a:r>
               <a:rPr lang="en-US" sz="2400" b="1" dirty="0"/>
-              <a:t>Transform</a:t>
-            </a:r>
-          </a:p>
-          <a:p>
-            <a:r>
-              <a:rPr lang="en-US" dirty="0"/>
-              <a:t>Cleaned up the JSON in various ways including:</a:t>
-            </a:r>
-          </a:p>
-          <a:p>
-            <a:pPr lvl="1"/>
-            <a:r>
-              <a:rPr lang="en-US" dirty="0"/>
-              <a:t>No API key was required as the data is public.</a:t>
-            </a:r>
-          </a:p>
-          <a:p>
-            <a:pPr lvl="1"/>
-            <a:r>
-              <a:rPr lang="en-US" dirty="0"/>
-              <a:t>Filtered by “date”, “positive” and “negative” cases.</a:t>
-            </a:r>
-          </a:p>
-          <a:p>
-            <a:pPr lvl="1"/>
-            <a:r>
-              <a:rPr lang="en-US" dirty="0"/>
-              <a:t>Dropped Nan values.</a:t>
-            </a:r>
-          </a:p>
-          <a:p>
-            <a:pPr lvl="1"/>
-            <a:r>
-              <a:rPr lang="en-US" dirty="0"/>
-              <a:t>Reassigned data types </a:t>
-            </a:r>
-          </a:p>
-          <a:p>
-            <a:pPr lvl="2"/>
-            <a:r>
-              <a:rPr lang="en-US" dirty="0"/>
-              <a:t>“float” to “int”</a:t>
-            </a:r>
-          </a:p>
-          <a:p>
-            <a:pPr lvl="2"/>
-            <a:r>
-              <a:rPr lang="en-US" dirty="0"/>
-              <a:t>“int” to “Datetime”</a:t>
-            </a:r>
-          </a:p>
-          <a:p>
-            <a:pPr lvl="3"/>
-            <a:r>
-              <a:rPr lang="en-US" dirty="0"/>
-              <a:t>In converting to “Datetime” we found it necessary to first convert ”int” to ”string” and then ”string” to ”Datetime”.</a:t>
-            </a:r>
-          </a:p>
-          <a:p>
-            <a:pPr lvl="1"/>
-            <a:r>
-              <a:rPr lang="en-US" dirty="0"/>
-              <a:t>Sorted values in ascending order to match CSV data.</a:t>
-            </a:r>
-          </a:p>
-          <a:p>
-            <a:pPr lvl="1"/>
-            <a:r>
-              <a:rPr lang="en-US" dirty="0"/>
-              <a:t>Filtered date range to match CSV data due to the fact that the Vaccine data necessarily had a narrower range of dates than COVID cases data.</a:t>
-            </a:r>
-          </a:p>
-          <a:p>
-            <a:pPr lvl="1"/>
-            <a:endParaRPr lang="en-US" dirty="0"/>
-          </a:p>
-          <a:p>
-            <a:pPr marL="274320" lvl="1" indent="0">
-              <a:buNone/>
-            </a:pPr>
-            <a:endParaRPr lang="en-US" dirty="0"/>
-          </a:p>
-          <a:p>
-            <a:pPr lvl="1"/>
-            <a:endParaRPr lang="en-US" dirty="0"/>
-          </a:p>
-        </p:txBody>
-      </p:sp>
-      <p:pic>
-        <p:nvPicPr>
-          <p:cNvPr id="10" name="Picture 9" descr="A picture containing cake, fruit, decorated, plant&#10;&#10;Description automatically generated">
-            <a:extLst>
-              <a:ext uri="{FF2B5EF4-FFF2-40B4-BE49-F238E27FC236}">
-                <a16:creationId xmlns:a16="http://schemas.microsoft.com/office/drawing/2014/main" id="{85DFA71E-E5FE-3F4E-BD9E-4BFA550A89E2}"/>
-              </a:ext>
-            </a:extLst>
-          </p:cNvPr>
-          <p:cNvPicPr>
-            <a:picLocks noChangeAspect="1"/>
-          </p:cNvPicPr>
-          <p:nvPr/>
-        </p:nvPicPr>
-        <p:blipFill>
-          <a:blip r:embed="rId2"/>
-          <a:stretch>
-            <a:fillRect/>
-          </a:stretch>
-        </p:blipFill>
-        <p:spPr>
-          <a:xfrm>
-            <a:off x="8304696" y="1529522"/>
-            <a:ext cx="3494156" cy="3494156"/>
-          </a:xfrm>
-          <a:prstGeom prst="rect">
-            <a:avLst/>
-          </a:prstGeom>
-        </p:spPr>
-      </p:pic>
-    </p:spTree>
-    <p:extLst>
-      <p:ext uri="{BB962C8B-B14F-4D97-AF65-F5344CB8AC3E}">
-        <p14:creationId xmlns:p14="http://schemas.microsoft.com/office/powerpoint/2010/main" val="2973721604"/>
-      </p:ext>
-    </p:extLst>
-  </p:cSld>
-  <p:clrMapOvr>
-    <a:masterClrMapping/>
-  </p:clrMapOvr>
-</p:sld>
-</file>
-
-<file path=ppt/slides/slide6.xml><?xml version="1.0" encoding="utf-8"?>
-<p:sld xmlns:a="http://schemas.openxmlformats.org/drawingml/2006/main" xmlns:r="http://schemas.openxmlformats.org/officeDocument/2006/relationships" xmlns:p="http://schemas.openxmlformats.org/presentationml/2006/main">
-  <p:cSld>
-    <p:spTree>
-      <p:nvGrpSpPr>
-        <p:cNvPr id="1" name=""/>
-        <p:cNvGrpSpPr/>
-        <p:nvPr/>
-      </p:nvGrpSpPr>
-      <p:grpSpPr>
-        <a:xfrm>
-          <a:off x="0" y="0"/>
-          <a:ext cx="0" cy="0"/>
-          <a:chOff x="0" y="0"/>
-          <a:chExt cx="0" cy="0"/>
-        </a:xfrm>
-      </p:grpSpPr>
-      <p:sp>
-        <p:nvSpPr>
-          <p:cNvPr id="3" name="Content Placeholder 2">
-            <a:extLst>
-              <a:ext uri="{FF2B5EF4-FFF2-40B4-BE49-F238E27FC236}">
-                <a16:creationId xmlns:a16="http://schemas.microsoft.com/office/drawing/2014/main" id="{A2627992-747E-4903-8C5E-0728A49FEA6E}"/>
-              </a:ext>
-            </a:extLst>
-          </p:cNvPr>
-          <p:cNvSpPr>
-            <a:spLocks noGrp="1"/>
-          </p:cNvSpPr>
-          <p:nvPr>
-            <p:ph idx="1"/>
-          </p:nvPr>
-        </p:nvSpPr>
-        <p:spPr/>
-        <p:txBody>
-          <a:bodyPr/>
-          <a:lstStyle/>
-          <a:p>
-            <a:pPr marL="274320" lvl="1" indent="0">
-              <a:buNone/>
-            </a:pPr>
-            <a:endParaRPr lang="en-US" dirty="0"/>
-          </a:p>
-          <a:p>
-            <a:pPr marL="0" indent="0" algn="ctr">
-              <a:buNone/>
-            </a:pPr>
-            <a:r>
-              <a:rPr lang="en-US" sz="2400" b="1" dirty="0"/>
               <a:t>Load</a:t>
             </a:r>
           </a:p>
@@ -4947,7 +5261,7 @@
           <a:p>
             <a:r>
               <a:rPr lang="en-US" dirty="0"/>
-              <a:t>Joined the tables (COVID Cases data from CSV and COVID Vaccination data from JSON) based on date for the final product.</a:t>
+              <a:t>Joined the tables (COVID Vaccination data from CSV and COVID Cases data from JSON) based on date for the final product.</a:t>
             </a:r>
           </a:p>
           <a:p>
@@ -5013,6 +5327,111 @@
     <p:extLst>
       <p:ext uri="{BB962C8B-B14F-4D97-AF65-F5344CB8AC3E}">
         <p14:creationId xmlns:p14="http://schemas.microsoft.com/office/powerpoint/2010/main" val="4148408539"/>
+      </p:ext>
+    </p:extLst>
+  </p:cSld>
+  <p:clrMapOvr>
+    <a:masterClrMapping/>
+  </p:clrMapOvr>
+</p:sld>
+</file>
+
+<file path=ppt/slides/slide6.xml><?xml version="1.0" encoding="utf-8"?>
+<p:sld xmlns:a="http://schemas.openxmlformats.org/drawingml/2006/main" xmlns:r="http://schemas.openxmlformats.org/officeDocument/2006/relationships" xmlns:p="http://schemas.openxmlformats.org/presentationml/2006/main" showMasterSp="0">
+  <p:cSld>
+    <p:spTree>
+      <p:nvGrpSpPr>
+        <p:cNvPr id="1" name=""/>
+        <p:cNvGrpSpPr/>
+        <p:nvPr/>
+      </p:nvGrpSpPr>
+      <p:grpSpPr>
+        <a:xfrm>
+          <a:off x="0" y="0"/>
+          <a:ext cx="0" cy="0"/>
+          <a:chOff x="0" y="0"/>
+          <a:chExt cx="0" cy="0"/>
+        </a:xfrm>
+      </p:grpSpPr>
+      <p:sp>
+        <p:nvSpPr>
+          <p:cNvPr id="6" name="AutoShape 4">
+            <a:extLst>
+              <a:ext uri="{FF2B5EF4-FFF2-40B4-BE49-F238E27FC236}">
+                <a16:creationId xmlns:a16="http://schemas.microsoft.com/office/drawing/2014/main" id="{E2416116-642C-A949-BC5D-8428CD88990E}"/>
+              </a:ext>
+            </a:extLst>
+          </p:cNvPr>
+          <p:cNvSpPr>
+            <a:spLocks noChangeAspect="1" noChangeArrowheads="1"/>
+          </p:cNvSpPr>
+          <p:nvPr/>
+        </p:nvSpPr>
+        <p:spPr bwMode="auto">
+          <a:xfrm>
+            <a:off x="1143000" y="-1524000"/>
+            <a:ext cx="5105400" cy="5105400"/>
+          </a:xfrm>
+          <a:prstGeom prst="rect">
+            <a:avLst/>
+          </a:prstGeom>
+          <a:noFill/>
+          <a:extLst>
+            <a:ext uri="{909E8E84-426E-40DD-AFC4-6F175D3DCCD1}">
+              <a14:hiddenFill xmlns:a14="http://schemas.microsoft.com/office/drawing/2010/main">
+                <a:solidFill>
+                  <a:srgbClr val="FFFFFF"/>
+                </a:solidFill>
+              </a14:hiddenFill>
+            </a:ext>
+          </a:extLst>
+        </p:spPr>
+        <p:txBody>
+          <a:bodyPr vert="horz" wrap="square" lIns="91440" tIns="45720" rIns="91440" bIns="45720" numCol="1" anchor="t" anchorCtr="0" compatLnSpc="1">
+            <a:prstTxWarp prst="textNoShape">
+              <a:avLst/>
+            </a:prstTxWarp>
+          </a:bodyPr>
+          <a:lstStyle/>
+          <a:p>
+            <a:endParaRPr lang="en-US"/>
+          </a:p>
+        </p:txBody>
+      </p:sp>
+      <p:pic>
+        <p:nvPicPr>
+          <p:cNvPr id="10" name="Picture 9" descr="Table&#10;&#10;Description automatically generated with medium confidence">
+            <a:extLst>
+              <a:ext uri="{FF2B5EF4-FFF2-40B4-BE49-F238E27FC236}">
+                <a16:creationId xmlns:a16="http://schemas.microsoft.com/office/drawing/2014/main" id="{168CA38D-20AB-8F4F-ACE9-260F58A9D81B}"/>
+              </a:ext>
+            </a:extLst>
+          </p:cNvPr>
+          <p:cNvPicPr>
+            <a:picLocks noChangeAspect="1"/>
+          </p:cNvPicPr>
+          <p:nvPr/>
+        </p:nvPicPr>
+        <p:blipFill>
+          <a:blip r:embed="rId2"/>
+          <a:stretch>
+            <a:fillRect/>
+          </a:stretch>
+        </p:blipFill>
+        <p:spPr>
+          <a:xfrm>
+            <a:off x="0" y="1634982"/>
+            <a:ext cx="12192000" cy="3588036"/>
+          </a:xfrm>
+          <a:prstGeom prst="rect">
+            <a:avLst/>
+          </a:prstGeom>
+        </p:spPr>
+      </p:pic>
+    </p:spTree>
+    <p:extLst>
+      <p:ext uri="{BB962C8B-B14F-4D97-AF65-F5344CB8AC3E}">
+        <p14:creationId xmlns:p14="http://schemas.microsoft.com/office/powerpoint/2010/main" val="1561972118"/>
       </p:ext>
     </p:extLst>
   </p:cSld>
@@ -5298,7 +5717,320 @@
 </a:theme>
 </file>
 
+<file path=ppt/theme/theme2.xml><?xml version="1.0" encoding="utf-8"?>
+<a:theme xmlns:a="http://schemas.openxmlformats.org/drawingml/2006/main" name="Office Theme">
+  <a:themeElements>
+    <a:clrScheme name="Office">
+      <a:dk1>
+        <a:sysClr val="windowText" lastClr="000000"/>
+      </a:dk1>
+      <a:lt1>
+        <a:sysClr val="window" lastClr="FFFFFF"/>
+      </a:lt1>
+      <a:dk2>
+        <a:srgbClr val="44546A"/>
+      </a:dk2>
+      <a:lt2>
+        <a:srgbClr val="E7E6E6"/>
+      </a:lt2>
+      <a:accent1>
+        <a:srgbClr val="4472C4"/>
+      </a:accent1>
+      <a:accent2>
+        <a:srgbClr val="ED7D31"/>
+      </a:accent2>
+      <a:accent3>
+        <a:srgbClr val="A5A5A5"/>
+      </a:accent3>
+      <a:accent4>
+        <a:srgbClr val="FFC000"/>
+      </a:accent4>
+      <a:accent5>
+        <a:srgbClr val="5B9BD5"/>
+      </a:accent5>
+      <a:accent6>
+        <a:srgbClr val="70AD47"/>
+      </a:accent6>
+      <a:hlink>
+        <a:srgbClr val="0563C1"/>
+      </a:hlink>
+      <a:folHlink>
+        <a:srgbClr val="954F72"/>
+      </a:folHlink>
+    </a:clrScheme>
+    <a:fontScheme name="Office">
+      <a:majorFont>
+        <a:latin typeface="Calibri Light" panose="020F0302020204030204"/>
+        <a:ea typeface=""/>
+        <a:cs typeface=""/>
+        <a:font script="Jpan" typeface="游ゴシック Light"/>
+        <a:font script="Hang" typeface="맑은 고딕"/>
+        <a:font script="Hans" typeface="等线 Light"/>
+        <a:font script="Hant" typeface="新細明體"/>
+        <a:font script="Arab" typeface="Times New Roman"/>
+        <a:font script="Hebr" typeface="Times New Roman"/>
+        <a:font script="Thai" typeface="Angsana New"/>
+        <a:font script="Ethi" typeface="Nyala"/>
+        <a:font script="Beng" typeface="Vrinda"/>
+        <a:font script="Gujr" typeface="Shruti"/>
+        <a:font script="Khmr" typeface="MoolBoran"/>
+        <a:font script="Knda" typeface="Tunga"/>
+        <a:font script="Guru" typeface="Raavi"/>
+        <a:font script="Cans" typeface="Euphemia"/>
+        <a:font script="Cher" typeface="Plantagenet Cherokee"/>
+        <a:font script="Yiii" typeface="Microsoft Yi Baiti"/>
+        <a:font script="Tibt" typeface="Microsoft Himalaya"/>
+        <a:font script="Thaa" typeface="MV Boli"/>
+        <a:font script="Deva" typeface="Mangal"/>
+        <a:font script="Telu" typeface="Gautami"/>
+        <a:font script="Taml" typeface="Latha"/>
+        <a:font script="Syrc" typeface="Estrangelo Edessa"/>
+        <a:font script="Orya" typeface="Kalinga"/>
+        <a:font script="Mlym" typeface="Kartika"/>
+        <a:font script="Laoo" typeface="DokChampa"/>
+        <a:font script="Sinh" typeface="Iskoola Pota"/>
+        <a:font script="Mong" typeface="Mongolian Baiti"/>
+        <a:font script="Viet" typeface="Times New Roman"/>
+        <a:font script="Uigh" typeface="Microsoft Uighur"/>
+        <a:font script="Geor" typeface="Sylfaen"/>
+        <a:font script="Armn" typeface="Arial"/>
+        <a:font script="Bugi" typeface="Leelawadee UI"/>
+        <a:font script="Bopo" typeface="Microsoft JhengHei"/>
+        <a:font script="Java" typeface="Javanese Text"/>
+        <a:font script="Lisu" typeface="Segoe UI"/>
+        <a:font script="Mymr" typeface="Myanmar Text"/>
+        <a:font script="Nkoo" typeface="Ebrima"/>
+        <a:font script="Olck" typeface="Nirmala UI"/>
+        <a:font script="Osma" typeface="Ebrima"/>
+        <a:font script="Phag" typeface="Phagspa"/>
+        <a:font script="Syrn" typeface="Estrangelo Edessa"/>
+        <a:font script="Syrj" typeface="Estrangelo Edessa"/>
+        <a:font script="Syre" typeface="Estrangelo Edessa"/>
+        <a:font script="Sora" typeface="Nirmala UI"/>
+        <a:font script="Tale" typeface="Microsoft Tai Le"/>
+        <a:font script="Talu" typeface="Microsoft New Tai Lue"/>
+        <a:font script="Tfng" typeface="Ebrima"/>
+      </a:majorFont>
+      <a:minorFont>
+        <a:latin typeface="Calibri" panose="020F0502020204030204"/>
+        <a:ea typeface=""/>
+        <a:cs typeface=""/>
+        <a:font script="Jpan" typeface="游ゴシック"/>
+        <a:font script="Hang" typeface="맑은 고딕"/>
+        <a:font script="Hans" typeface="等线"/>
+        <a:font script="Hant" typeface="新細明體"/>
+        <a:font script="Arab" typeface="Arial"/>
+        <a:font script="Hebr" typeface="Arial"/>
+        <a:font script="Thai" typeface="Cordia New"/>
+        <a:font script="Ethi" typeface="Nyala"/>
+        <a:font script="Beng" typeface="Vrinda"/>
+        <a:font script="Gujr" typeface="Shruti"/>
+        <a:font script="Khmr" typeface="DaunPenh"/>
+        <a:font script="Knda" typeface="Tunga"/>
+        <a:font script="Guru" typeface="Raavi"/>
+        <a:font script="Cans" typeface="Euphemia"/>
+        <a:font script="Cher" typeface="Plantagenet Cherokee"/>
+        <a:font script="Yiii" typeface="Microsoft Yi Baiti"/>
+        <a:font script="Tibt" typeface="Microsoft Himalaya"/>
+        <a:font script="Thaa" typeface="MV Boli"/>
+        <a:font script="Deva" typeface="Mangal"/>
+        <a:font script="Telu" typeface="Gautami"/>
+        <a:font script="Taml" typeface="Latha"/>
+        <a:font script="Syrc" typeface="Estrangelo Edessa"/>
+        <a:font script="Orya" typeface="Kalinga"/>
+        <a:font script="Mlym" typeface="Kartika"/>
+        <a:font script="Laoo" typeface="DokChampa"/>
+        <a:font script="Sinh" typeface="Iskoola Pota"/>
+        <a:font script="Mong" typeface="Mongolian Baiti"/>
+        <a:font script="Viet" typeface="Arial"/>
+        <a:font script="Uigh" typeface="Microsoft Uighur"/>
+        <a:font script="Geor" typeface="Sylfaen"/>
+        <a:font script="Armn" typeface="Arial"/>
+        <a:font script="Bugi" typeface="Leelawadee UI"/>
+        <a:font script="Bopo" typeface="Microsoft JhengHei"/>
+        <a:font script="Java" typeface="Javanese Text"/>
+        <a:font script="Lisu" typeface="Segoe UI"/>
+        <a:font script="Mymr" typeface="Myanmar Text"/>
+        <a:font script="Nkoo" typeface="Ebrima"/>
+        <a:font script="Olck" typeface="Nirmala UI"/>
+        <a:font script="Osma" typeface="Ebrima"/>
+        <a:font script="Phag" typeface="Phagspa"/>
+        <a:font script="Syrn" typeface="Estrangelo Edessa"/>
+        <a:font script="Syrj" typeface="Estrangelo Edessa"/>
+        <a:font script="Syre" typeface="Estrangelo Edessa"/>
+        <a:font script="Sora" typeface="Nirmala UI"/>
+        <a:font script="Tale" typeface="Microsoft Tai Le"/>
+        <a:font script="Talu" typeface="Microsoft New Tai Lue"/>
+        <a:font script="Tfng" typeface="Ebrima"/>
+      </a:minorFont>
+    </a:fontScheme>
+    <a:fmtScheme name="Office">
+      <a:fillStyleLst>
+        <a:solidFill>
+          <a:schemeClr val="phClr"/>
+        </a:solidFill>
+        <a:gradFill rotWithShape="1">
+          <a:gsLst>
+            <a:gs pos="0">
+              <a:schemeClr val="phClr">
+                <a:lumMod val="110000"/>
+                <a:satMod val="105000"/>
+                <a:tint val="67000"/>
+              </a:schemeClr>
+            </a:gs>
+            <a:gs pos="50000">
+              <a:schemeClr val="phClr">
+                <a:lumMod val="105000"/>
+                <a:satMod val="103000"/>
+                <a:tint val="73000"/>
+              </a:schemeClr>
+            </a:gs>
+            <a:gs pos="100000">
+              <a:schemeClr val="phClr">
+                <a:lumMod val="105000"/>
+                <a:satMod val="109000"/>
+                <a:tint val="81000"/>
+              </a:schemeClr>
+            </a:gs>
+          </a:gsLst>
+          <a:lin ang="5400000" scaled="0"/>
+        </a:gradFill>
+        <a:gradFill rotWithShape="1">
+          <a:gsLst>
+            <a:gs pos="0">
+              <a:schemeClr val="phClr">
+                <a:satMod val="103000"/>
+                <a:lumMod val="102000"/>
+                <a:tint val="94000"/>
+              </a:schemeClr>
+            </a:gs>
+            <a:gs pos="50000">
+              <a:schemeClr val="phClr">
+                <a:satMod val="110000"/>
+                <a:lumMod val="100000"/>
+                <a:shade val="100000"/>
+              </a:schemeClr>
+            </a:gs>
+            <a:gs pos="100000">
+              <a:schemeClr val="phClr">
+                <a:lumMod val="99000"/>
+                <a:satMod val="120000"/>
+                <a:shade val="78000"/>
+              </a:schemeClr>
+            </a:gs>
+          </a:gsLst>
+          <a:lin ang="5400000" scaled="0"/>
+        </a:gradFill>
+      </a:fillStyleLst>
+      <a:lnStyleLst>
+        <a:ln w="6350" cap="flat" cmpd="sng" algn="ctr">
+          <a:solidFill>
+            <a:schemeClr val="phClr"/>
+          </a:solidFill>
+          <a:prstDash val="solid"/>
+          <a:miter lim="800000"/>
+        </a:ln>
+        <a:ln w="12700" cap="flat" cmpd="sng" algn="ctr">
+          <a:solidFill>
+            <a:schemeClr val="phClr"/>
+          </a:solidFill>
+          <a:prstDash val="solid"/>
+          <a:miter lim="800000"/>
+        </a:ln>
+        <a:ln w="19050" cap="flat" cmpd="sng" algn="ctr">
+          <a:solidFill>
+            <a:schemeClr val="phClr"/>
+          </a:solidFill>
+          <a:prstDash val="solid"/>
+          <a:miter lim="800000"/>
+        </a:ln>
+      </a:lnStyleLst>
+      <a:effectStyleLst>
+        <a:effectStyle>
+          <a:effectLst/>
+        </a:effectStyle>
+        <a:effectStyle>
+          <a:effectLst/>
+        </a:effectStyle>
+        <a:effectStyle>
+          <a:effectLst>
+            <a:outerShdw blurRad="57150" dist="19050" dir="5400000" algn="ctr" rotWithShape="0">
+              <a:srgbClr val="000000">
+                <a:alpha val="63000"/>
+              </a:srgbClr>
+            </a:outerShdw>
+          </a:effectLst>
+        </a:effectStyle>
+      </a:effectStyleLst>
+      <a:bgFillStyleLst>
+        <a:solidFill>
+          <a:schemeClr val="phClr"/>
+        </a:solidFill>
+        <a:solidFill>
+          <a:schemeClr val="phClr">
+            <a:tint val="95000"/>
+            <a:satMod val="170000"/>
+          </a:schemeClr>
+        </a:solidFill>
+        <a:gradFill rotWithShape="1">
+          <a:gsLst>
+            <a:gs pos="0">
+              <a:schemeClr val="phClr">
+                <a:tint val="93000"/>
+                <a:satMod val="150000"/>
+                <a:shade val="98000"/>
+                <a:lumMod val="102000"/>
+              </a:schemeClr>
+            </a:gs>
+            <a:gs pos="50000">
+              <a:schemeClr val="phClr">
+                <a:tint val="98000"/>
+                <a:satMod val="130000"/>
+                <a:shade val="90000"/>
+                <a:lumMod val="103000"/>
+              </a:schemeClr>
+            </a:gs>
+            <a:gs pos="100000">
+              <a:schemeClr val="phClr">
+                <a:shade val="63000"/>
+                <a:satMod val="120000"/>
+              </a:schemeClr>
+            </a:gs>
+          </a:gsLst>
+          <a:lin ang="5400000" scaled="0"/>
+        </a:gradFill>
+      </a:bgFillStyleLst>
+    </a:fmtScheme>
+  </a:themeElements>
+  <a:objectDefaults/>
+  <a:extraClrSchemeLst/>
+  <a:extLst>
+    <a:ext uri="{05A4C25C-085E-4340-85A3-A5531E510DB2}">
+      <thm15:themeFamily xmlns:thm15="http://schemas.microsoft.com/office/thememl/2012/main" name="Office Theme" id="{62F939B6-93AF-4DB8-9C6B-D6C7DFDC589F}" vid="{4A3C46E8-61CC-4603-A589-7422A47A8E4A}"/>
+    </a:ext>
+  </a:extLst>
+</a:theme>
+</file>
+
 <file path=customXml/item1.xml><?xml version="1.0" encoding="utf-8"?>
+<p:properties xmlns:p="http://schemas.microsoft.com/office/2006/metadata/properties" xmlns:xsi="http://www.w3.org/2001/XMLSchema-instance" xmlns:pc="http://schemas.microsoft.com/office/infopath/2007/PartnerControls">
+  <documentManagement>
+    <Status xmlns="71af3243-3dd4-4a8d-8c0d-dd76da1f02a5">Not started</Status>
+    <MediaServiceKeyPoints xmlns="71af3243-3dd4-4a8d-8c0d-dd76da1f02a5" xsi:nil="true"/>
+  </documentManagement>
+</p:properties>
+</file>
+
+<file path=customXml/item2.xml><?xml version="1.0" encoding="utf-8"?>
+<?mso-contentType ?>
+<FormTemplates xmlns="http://schemas.microsoft.com/sharepoint/v3/contenttype/forms">
+  <Display>DocumentLibraryForm</Display>
+  <Edit>DocumentLibraryForm</Edit>
+  <New>DocumentLibraryForm</New>
+</FormTemplates>
+</file>
+
+<file path=customXml/item3.xml><?xml version="1.0" encoding="utf-8"?>
 <ct:contentTypeSchema xmlns:ct="http://schemas.microsoft.com/office/2006/metadata/contentType" xmlns:ma="http://schemas.microsoft.com/office/2006/metadata/properties/metaAttributes" ct:_="" ma:_="" ma:contentTypeName="Document" ma:contentTypeID="0x01010079F111ED35F8CC479449609E8A0923A6" ma:contentTypeVersion="12" ma:contentTypeDescription="Create a new document." ma:contentTypeScope="" ma:versionID="a410dd7f93c95333ffa1b60ed6adedd1">
   <xsd:schema xmlns:xsd="http://www.w3.org/2001/XMLSchema" xmlns:xs="http://www.w3.org/2001/XMLSchema" xmlns:p="http://schemas.microsoft.com/office/2006/metadata/properties" xmlns:ns2="71af3243-3dd4-4a8d-8c0d-dd76da1f02a5" xmlns:ns3="16c05727-aa75-4e4a-9b5f-8a80a1165891" targetNamespace="http://schemas.microsoft.com/office/2006/metadata/properties" ma:root="true" ma:fieldsID="a936d9baba76aa3866493feff160faab" ns2:_="" ns3:_="">
     <xsd:import namespace="71af3243-3dd4-4a8d-8c0d-dd76da1f02a5"/>
@@ -5519,25 +6251,25 @@
 </ct:contentTypeSchema>
 </file>
 
-<file path=customXml/item2.xml><?xml version="1.0" encoding="utf-8"?>
-<?mso-contentType ?>
-<FormTemplates xmlns="http://schemas.microsoft.com/sharepoint/v3/contenttype/forms">
-  <Display>DocumentLibraryForm</Display>
-  <Edit>DocumentLibraryForm</Edit>
-  <New>DocumentLibraryForm</New>
-</FormTemplates>
+<file path=customXml/itemProps1.xml><?xml version="1.0" encoding="utf-8"?>
+<ds:datastoreItem xmlns:ds="http://schemas.openxmlformats.org/officeDocument/2006/customXml" ds:itemID="{137651BA-F45C-4845-9AB3-E0A65B39F5E1}">
+  <ds:schemaRefs>
+    <ds:schemaRef ds:uri="http://schemas.microsoft.com/office/2006/metadata/properties"/>
+    <ds:schemaRef ds:uri="http://schemas.microsoft.com/office/infopath/2007/PartnerControls"/>
+    <ds:schemaRef ds:uri="71af3243-3dd4-4a8d-8c0d-dd76da1f02a5"/>
+  </ds:schemaRefs>
+</ds:datastoreItem>
 </file>
 
-<file path=customXml/item3.xml><?xml version="1.0" encoding="utf-8"?>
-<p:properties xmlns:p="http://schemas.microsoft.com/office/2006/metadata/properties" xmlns:xsi="http://www.w3.org/2001/XMLSchema-instance" xmlns:pc="http://schemas.microsoft.com/office/infopath/2007/PartnerControls">
-  <documentManagement>
-    <Status xmlns="71af3243-3dd4-4a8d-8c0d-dd76da1f02a5">Not started</Status>
-    <MediaServiceKeyPoints xmlns="71af3243-3dd4-4a8d-8c0d-dd76da1f02a5" xsi:nil="true"/>
-  </documentManagement>
-</p:properties>
+<file path=customXml/itemProps2.xml><?xml version="1.0" encoding="utf-8"?>
+<ds:datastoreItem xmlns:ds="http://schemas.openxmlformats.org/officeDocument/2006/customXml" ds:itemID="{CDB58277-F8DF-46FF-84EC-EF41B835E69F}">
+  <ds:schemaRefs>
+    <ds:schemaRef ds:uri="http://schemas.microsoft.com/sharepoint/v3/contenttype/forms"/>
+  </ds:schemaRefs>
+</ds:datastoreItem>
 </file>
 
-<file path=customXml/itemProps1.xml><?xml version="1.0" encoding="utf-8"?>
+<file path=customXml/itemProps3.xml><?xml version="1.0" encoding="utf-8"?>
 <ds:datastoreItem xmlns:ds="http://schemas.openxmlformats.org/officeDocument/2006/customXml" ds:itemID="{2D276E62-80A3-44DD-9BCC-97ED2B99B57F}">
   <ds:schemaRefs>
     <ds:schemaRef ds:uri="http://schemas.microsoft.com/office/2006/metadata/contentType"/>
@@ -5554,22 +6286,4 @@
     <ds:schemaRef ds:uri="http://schemas.microsoft.com/internal/obd"/>
   </ds:schemaRefs>
 </ds:datastoreItem>
-</file>
-
-<file path=customXml/itemProps2.xml><?xml version="1.0" encoding="utf-8"?>
-<ds:datastoreItem xmlns:ds="http://schemas.openxmlformats.org/officeDocument/2006/customXml" ds:itemID="{CDB58277-F8DF-46FF-84EC-EF41B835E69F}">
-  <ds:schemaRefs>
-    <ds:schemaRef ds:uri="http://schemas.microsoft.com/sharepoint/v3/contenttype/forms"/>
-  </ds:schemaRefs>
-</ds:datastoreItem>
-</file>
-
-<file path=customXml/itemProps3.xml><?xml version="1.0" encoding="utf-8"?>
-<ds:datastoreItem xmlns:ds="http://schemas.openxmlformats.org/officeDocument/2006/customXml" ds:itemID="{137651BA-F45C-4845-9AB3-E0A65B39F5E1}">
-  <ds:schemaRefs>
-    <ds:schemaRef ds:uri="http://schemas.microsoft.com/office/2006/metadata/properties"/>
-    <ds:schemaRef ds:uri="http://schemas.microsoft.com/office/infopath/2007/PartnerControls"/>
-    <ds:schemaRef ds:uri="71af3243-3dd4-4a8d-8c0d-dd76da1f02a5"/>
-  </ds:schemaRefs>
-</ds:datastoreItem>
 </file>
</xml_diff>